<commit_message>
[ohhman][phaser] Transição das telas através do Menu
</commit_message>
<xml_diff>
--- a/phaser/ohhman/assets/screenshots/screenshots.pptx
+++ b/phaser/ohhman/assets/screenshots/screenshots.pptx
@@ -306,7 +306,7 @@
           <a:p>
             <a:fld id="{93945A38-A22D-409E-8801-20D8F8211029}" type="datetimeFigureOut">
               <a:rPr lang="pt-BR" smtClean="0"/>
-              <a:t>02/04/2014</a:t>
+              <a:t>03/04/2014</a:t>
             </a:fld>
             <a:endParaRPr lang="pt-BR"/>
           </a:p>
@@ -476,7 +476,7 @@
           <a:p>
             <a:fld id="{93945A38-A22D-409E-8801-20D8F8211029}" type="datetimeFigureOut">
               <a:rPr lang="pt-BR" smtClean="0"/>
-              <a:t>02/04/2014</a:t>
+              <a:t>03/04/2014</a:t>
             </a:fld>
             <a:endParaRPr lang="pt-BR"/>
           </a:p>
@@ -656,7 +656,7 @@
           <a:p>
             <a:fld id="{93945A38-A22D-409E-8801-20D8F8211029}" type="datetimeFigureOut">
               <a:rPr lang="pt-BR" smtClean="0"/>
-              <a:t>02/04/2014</a:t>
+              <a:t>03/04/2014</a:t>
             </a:fld>
             <a:endParaRPr lang="pt-BR"/>
           </a:p>
@@ -826,7 +826,7 @@
           <a:p>
             <a:fld id="{93945A38-A22D-409E-8801-20D8F8211029}" type="datetimeFigureOut">
               <a:rPr lang="pt-BR" smtClean="0"/>
-              <a:t>02/04/2014</a:t>
+              <a:t>03/04/2014</a:t>
             </a:fld>
             <a:endParaRPr lang="pt-BR"/>
           </a:p>
@@ -1072,7 +1072,7 @@
           <a:p>
             <a:fld id="{93945A38-A22D-409E-8801-20D8F8211029}" type="datetimeFigureOut">
               <a:rPr lang="pt-BR" smtClean="0"/>
-              <a:t>02/04/2014</a:t>
+              <a:t>03/04/2014</a:t>
             </a:fld>
             <a:endParaRPr lang="pt-BR"/>
           </a:p>
@@ -1360,7 +1360,7 @@
           <a:p>
             <a:fld id="{93945A38-A22D-409E-8801-20D8F8211029}" type="datetimeFigureOut">
               <a:rPr lang="pt-BR" smtClean="0"/>
-              <a:t>02/04/2014</a:t>
+              <a:t>03/04/2014</a:t>
             </a:fld>
             <a:endParaRPr lang="pt-BR"/>
           </a:p>
@@ -1782,7 +1782,7 @@
           <a:p>
             <a:fld id="{93945A38-A22D-409E-8801-20D8F8211029}" type="datetimeFigureOut">
               <a:rPr lang="pt-BR" smtClean="0"/>
-              <a:t>02/04/2014</a:t>
+              <a:t>03/04/2014</a:t>
             </a:fld>
             <a:endParaRPr lang="pt-BR"/>
           </a:p>
@@ -1900,7 +1900,7 @@
           <a:p>
             <a:fld id="{93945A38-A22D-409E-8801-20D8F8211029}" type="datetimeFigureOut">
               <a:rPr lang="pt-BR" smtClean="0"/>
-              <a:t>02/04/2014</a:t>
+              <a:t>03/04/2014</a:t>
             </a:fld>
             <a:endParaRPr lang="pt-BR"/>
           </a:p>
@@ -1995,7 +1995,7 @@
           <a:p>
             <a:fld id="{93945A38-A22D-409E-8801-20D8F8211029}" type="datetimeFigureOut">
               <a:rPr lang="pt-BR" smtClean="0"/>
-              <a:t>02/04/2014</a:t>
+              <a:t>03/04/2014</a:t>
             </a:fld>
             <a:endParaRPr lang="pt-BR"/>
           </a:p>
@@ -2272,7 +2272,7 @@
           <a:p>
             <a:fld id="{93945A38-A22D-409E-8801-20D8F8211029}" type="datetimeFigureOut">
               <a:rPr lang="pt-BR" smtClean="0"/>
-              <a:t>02/04/2014</a:t>
+              <a:t>03/04/2014</a:t>
             </a:fld>
             <a:endParaRPr lang="pt-BR"/>
           </a:p>
@@ -2525,7 +2525,7 @@
           <a:p>
             <a:fld id="{93945A38-A22D-409E-8801-20D8F8211029}" type="datetimeFigureOut">
               <a:rPr lang="pt-BR" smtClean="0"/>
-              <a:t>02/04/2014</a:t>
+              <a:t>03/04/2014</a:t>
             </a:fld>
             <a:endParaRPr lang="pt-BR"/>
           </a:p>
@@ -2738,7 +2738,7 @@
           <a:p>
             <a:fld id="{93945A38-A22D-409E-8801-20D8F8211029}" type="datetimeFigureOut">
               <a:rPr lang="pt-BR" smtClean="0"/>
-              <a:t>02/04/2014</a:t>
+              <a:t>03/04/2014</a:t>
             </a:fld>
             <a:endParaRPr lang="pt-BR"/>
           </a:p>
@@ -6098,28 +6098,10 @@
             <a:p>
               <a:pPr algn="ctr"/>
               <a:r>
-                <a:rPr lang="pt-BR" sz="4000" dirty="0" err="1" smtClean="0">
-                  <a:latin typeface="Andy" panose="03080602030302030203" pitchFamily="66" charset="0"/>
-                </a:rPr>
-                <a:t>How</a:t>
-              </a:r>
-              <a:r>
                 <a:rPr lang="pt-BR" sz="4000" dirty="0" smtClean="0">
                   <a:latin typeface="Andy" panose="03080602030302030203" pitchFamily="66" charset="0"/>
                 </a:rPr>
-                <a:t> </a:t>
-              </a:r>
-              <a:r>
-                <a:rPr lang="pt-BR" sz="4000" dirty="0" err="1" smtClean="0">
-                  <a:latin typeface="Andy" panose="03080602030302030203" pitchFamily="66" charset="0"/>
-                </a:rPr>
-                <a:t>to</a:t>
-              </a:r>
-              <a:r>
-                <a:rPr lang="pt-BR" sz="4000" dirty="0" smtClean="0">
-                  <a:latin typeface="Andy" panose="03080602030302030203" pitchFamily="66" charset="0"/>
-                </a:rPr>
-                <a:t> Play</a:t>
+                <a:t>How to Play</a:t>
               </a:r>
               <a:endParaRPr lang="pt-BR" sz="4000" dirty="0">
                 <a:latin typeface="Andy" panose="03080602030302030203" pitchFamily="66" charset="0"/>
@@ -7513,28 +7495,10 @@
             <a:p>
               <a:pPr algn="ctr"/>
               <a:r>
-                <a:rPr lang="pt-BR" sz="4000" dirty="0" err="1" smtClean="0">
-                  <a:latin typeface="Andy" panose="03080602030302030203" pitchFamily="66" charset="0"/>
-                </a:rPr>
-                <a:t>How</a:t>
-              </a:r>
-              <a:r>
                 <a:rPr lang="pt-BR" sz="4000" dirty="0" smtClean="0">
                   <a:latin typeface="Andy" panose="03080602030302030203" pitchFamily="66" charset="0"/>
                 </a:rPr>
-                <a:t> </a:t>
-              </a:r>
-              <a:r>
-                <a:rPr lang="pt-BR" sz="4000" dirty="0" err="1" smtClean="0">
-                  <a:latin typeface="Andy" panose="03080602030302030203" pitchFamily="66" charset="0"/>
-                </a:rPr>
-                <a:t>to</a:t>
-              </a:r>
-              <a:r>
-                <a:rPr lang="pt-BR" sz="4000" dirty="0" smtClean="0">
-                  <a:latin typeface="Andy" panose="03080602030302030203" pitchFamily="66" charset="0"/>
-                </a:rPr>
-                <a:t> Play</a:t>
+                <a:t>How to Play</a:t>
               </a:r>
               <a:endParaRPr lang="pt-BR" sz="4000" dirty="0">
                 <a:latin typeface="Andy" panose="03080602030302030203" pitchFamily="66" charset="0"/>
@@ -13458,28 +13422,10 @@
             <a:p>
               <a:pPr algn="ctr"/>
               <a:r>
-                <a:rPr lang="pt-BR" sz="4000" dirty="0" err="1" smtClean="0">
-                  <a:latin typeface="Andy" panose="03080602030302030203" pitchFamily="66" charset="0"/>
-                </a:rPr>
-                <a:t>How</a:t>
-              </a:r>
-              <a:r>
                 <a:rPr lang="pt-BR" sz="4000" dirty="0" smtClean="0">
                   <a:latin typeface="Andy" panose="03080602030302030203" pitchFamily="66" charset="0"/>
                 </a:rPr>
-                <a:t> </a:t>
-              </a:r>
-              <a:r>
-                <a:rPr lang="pt-BR" sz="4000" dirty="0" err="1" smtClean="0">
-                  <a:latin typeface="Andy" panose="03080602030302030203" pitchFamily="66" charset="0"/>
-                </a:rPr>
-                <a:t>to</a:t>
-              </a:r>
-              <a:r>
-                <a:rPr lang="pt-BR" sz="4000" dirty="0" smtClean="0">
-                  <a:latin typeface="Andy" panose="03080602030302030203" pitchFamily="66" charset="0"/>
-                </a:rPr>
-                <a:t> Play</a:t>
+                <a:t>How to Play</a:t>
               </a:r>
               <a:endParaRPr lang="pt-BR" sz="4000" dirty="0">
                 <a:latin typeface="Andy" panose="03080602030302030203" pitchFamily="66" charset="0"/>
@@ -15128,28 +15074,10 @@
             <a:p>
               <a:pPr algn="ctr"/>
               <a:r>
-                <a:rPr lang="pt-BR" sz="4000" dirty="0" err="1" smtClean="0">
-                  <a:latin typeface="Andy" panose="03080602030302030203" pitchFamily="66" charset="0"/>
-                </a:rPr>
-                <a:t>How</a:t>
-              </a:r>
-              <a:r>
                 <a:rPr lang="pt-BR" sz="4000" dirty="0" smtClean="0">
                   <a:latin typeface="Andy" panose="03080602030302030203" pitchFamily="66" charset="0"/>
                 </a:rPr>
-                <a:t> </a:t>
-              </a:r>
-              <a:r>
-                <a:rPr lang="pt-BR" sz="4000" dirty="0" err="1" smtClean="0">
-                  <a:latin typeface="Andy" panose="03080602030302030203" pitchFamily="66" charset="0"/>
-                </a:rPr>
-                <a:t>to</a:t>
-              </a:r>
-              <a:r>
-                <a:rPr lang="pt-BR" sz="4000" dirty="0" smtClean="0">
-                  <a:latin typeface="Andy" panose="03080602030302030203" pitchFamily="66" charset="0"/>
-                </a:rPr>
-                <a:t> Play</a:t>
+                <a:t>How to Play</a:t>
               </a:r>
               <a:endParaRPr lang="pt-BR" sz="4000" dirty="0">
                 <a:latin typeface="Andy" panose="03080602030302030203" pitchFamily="66" charset="0"/>

</xml_diff>